<commit_message>
last minute presentation changes
</commit_message>
<xml_diff>
--- a/Documentation/DesignPresentation.pptx
+++ b/Documentation/DesignPresentation.pptx
@@ -5793,18 +5793,7 @@
                 <a:ea typeface=""/>
                 <a:cs typeface=""/>
               </a:rPr>
-              <a:t>VGA BRAM </a:t>
-            </a:r>
-            <a:r>
-              <a:rPr lang="en-US" noProof="0" dirty="0" smtClean="0">
-                <a:solidFill>
-                  <a:sysClr val="windowText" lastClr="000000"/>
-                </a:solidFill>
-                <a:latin typeface="Calibri"/>
-                <a:ea typeface=""/>
-                <a:cs typeface=""/>
-              </a:rPr>
-              <a:t>Display Module</a:t>
+              <a:t>VGA BRAM Display Module</a:t>
             </a:r>
             <a:endParaRPr kumimoji="0" lang="en-US" sz="4400" b="0" i="0" u="none" strike="noStrike" kern="1200" cap="none" spc="0" normalizeH="0" baseline="0" noProof="0" dirty="0">
               <a:ln>
@@ -6032,14 +6021,6 @@
               </a:rPr>
               <a:t>Current and desired temperature are written to BRAM over Wishbone</a:t>
             </a:r>
-            <a:endParaRPr lang="en-US" dirty="0" smtClean="0">
-              <a:solidFill>
-                <a:sysClr val="windowText" lastClr="000000"/>
-              </a:solidFill>
-              <a:latin typeface="Calibri"/>
-              <a:ea typeface=""/>
-              <a:cs typeface=""/>
-            </a:endParaRPr>
           </a:p>
           <a:p>
             <a:pPr>
@@ -8971,14 +8952,6 @@
               </a:rPr>
               <a:t>Set fan to 60% after 5 seconds and </a:t>
             </a:r>
-            <a:endParaRPr lang="en-US" sz="2400" dirty="0" smtClean="0">
-              <a:solidFill>
-                <a:sysClr val="windowText" lastClr="000000"/>
-              </a:solidFill>
-              <a:latin typeface="Calibri"/>
-              <a:ea typeface=""/>
-              <a:cs typeface=""/>
-            </a:endParaRPr>
           </a:p>
           <a:p>
             <a:pPr>
@@ -9004,18 +8977,7 @@
                 <a:ea typeface=""/>
                 <a:cs typeface=""/>
               </a:rPr>
-              <a:t>aptured </a:t>
-            </a:r>
-            <a:r>
-              <a:rPr lang="en-US" sz="2400" dirty="0" smtClean="0">
-                <a:solidFill>
-                  <a:sysClr val="windowText" lastClr="000000"/>
-                </a:solidFill>
-                <a:latin typeface="Calibri"/>
-                <a:ea typeface=""/>
-                <a:cs typeface=""/>
-              </a:rPr>
-              <a:t>temperature data through serial port</a:t>
+              <a:t>aptured temperature data through serial port</a:t>
             </a:r>
           </a:p>
           <a:p>
@@ -9444,18 +9406,7 @@
                 <a:ea typeface=""/>
                 <a:cs typeface=""/>
               </a:rPr>
-              <a:t>Controller Design </a:t>
-            </a:r>
-            <a:r>
-              <a:rPr lang="en-US" dirty="0" smtClean="0">
-                <a:solidFill>
-                  <a:sysClr val="windowText" lastClr="000000"/>
-                </a:solidFill>
-                <a:latin typeface="Calibri"/>
-                <a:ea typeface=""/>
-                <a:cs typeface=""/>
-              </a:rPr>
-              <a:t>and Results</a:t>
+              <a:t>Controller Design and Results</a:t>
             </a:r>
             <a:endParaRPr kumimoji="0" lang="en-US" sz="4400" b="0" i="0" u="none" strike="noStrike" kern="1200" cap="none" spc="0" normalizeH="0" baseline="0" noProof="0" dirty="0">
               <a:ln>
@@ -11269,6 +11220,52 @@
               </a:rPr>
               <a:t>VGA</a:t>
             </a:r>
+          </a:p>
+          <a:p>
+            <a:pPr>
+              <a:defRPr/>
+            </a:pPr>
+            <a:r>
+              <a:rPr lang="en-US" dirty="0" smtClean="0">
+                <a:solidFill>
+                  <a:sysClr val="windowText" lastClr="000000"/>
+                </a:solidFill>
+                <a:latin typeface="Calibri"/>
+                <a:ea typeface=""/>
+                <a:cs typeface=""/>
+              </a:rPr>
+              <a:t>Move communication between fan, PID controller, </a:t>
+            </a:r>
+            <a:r>
+              <a:rPr lang="en-US" smtClean="0">
+                <a:solidFill>
+                  <a:sysClr val="windowText" lastClr="000000"/>
+                </a:solidFill>
+                <a:latin typeface="Calibri"/>
+                <a:ea typeface=""/>
+                <a:cs typeface=""/>
+              </a:rPr>
+              <a:t>temperature sensor, buttons and serial port </a:t>
+            </a:r>
+            <a:r>
+              <a:rPr lang="en-US" dirty="0" smtClean="0">
+                <a:solidFill>
+                  <a:sysClr val="windowText" lastClr="000000"/>
+                </a:solidFill>
+                <a:latin typeface="Calibri"/>
+                <a:ea typeface=""/>
+                <a:cs typeface=""/>
+              </a:rPr>
+              <a:t>to wishbone bus</a:t>
+            </a:r>
+            <a:endParaRPr lang="en-US" baseline="0" dirty="0" smtClean="0">
+              <a:solidFill>
+                <a:sysClr val="windowText" lastClr="000000"/>
+              </a:solidFill>
+              <a:latin typeface="Calibri"/>
+              <a:ea typeface=""/>
+              <a:cs typeface=""/>
+            </a:endParaRPr>
           </a:p>
         </p:txBody>
       </p:sp>
@@ -13309,11 +13306,7 @@
             </a:r>
             <a:r>
               <a:rPr lang="en-US" dirty="0" smtClean="0"/>
-              <a:t>n </a:t>
-            </a:r>
-            <a:r>
-              <a:rPr lang="en-US" dirty="0" smtClean="0"/>
-              <a:t>board I/O</a:t>
+              <a:t>n board I/O</a:t>
             </a:r>
             <a:endParaRPr lang="en-US" dirty="0"/>
           </a:p>
@@ -13611,24 +13604,7 @@
                 <a:ea typeface=""/>
                 <a:cs typeface=""/>
               </a:rPr>
-              <a:t> </a:t>
-            </a:r>
-            <a:r>
-              <a:rPr kumimoji="0" lang="en-US" sz="4400" b="0" i="0" u="none" strike="noStrike" kern="1200" cap="none" spc="0" normalizeH="0" noProof="0" dirty="0" smtClean="0">
-                <a:ln>
-                  <a:noFill/>
-                </a:ln>
-                <a:solidFill>
-                  <a:sysClr val="windowText" lastClr="000000"/>
-                </a:solidFill>
-                <a:effectLst/>
-                <a:uLnTx/>
-                <a:uFillTx/>
-                <a:latin typeface="Calibri"/>
-                <a:ea typeface=""/>
-                <a:cs typeface=""/>
-              </a:rPr>
-              <a:t>VHDL Architecture</a:t>
+              <a:t> VHDL Architecture</a:t>
             </a:r>
             <a:endParaRPr kumimoji="0" lang="en-US" sz="4400" b="0" i="0" u="none" strike="noStrike" kern="1200" cap="none" spc="0" normalizeH="0" baseline="0" noProof="0" dirty="0">
               <a:ln>
@@ -16625,13 +16601,6 @@
               </a:rPr>
               <a:t>XADC user guide</a:t>
             </a:r>
-            <a:endParaRPr lang="en-US" dirty="0">
-              <a:solidFill>
-                <a:schemeClr val="bg2">
-                  <a:lumMod val="50000"/>
-                </a:schemeClr>
-              </a:solidFill>
-            </a:endParaRPr>
           </a:p>
         </p:txBody>
       </p:sp>
@@ -18593,27 +18562,8 @@
                 <a:ea typeface=""/>
                 <a:cs typeface=""/>
               </a:rPr>
-              <a:t>DC motor is controlled with 0 to </a:t>
+              <a:t>DC motor is controlled with 0 to 5V</a:t>
             </a:r>
-            <a:r>
-              <a:rPr lang="en-US" sz="2400" dirty="0" smtClean="0">
-                <a:solidFill>
-                  <a:sysClr val="windowText" lastClr="000000"/>
-                </a:solidFill>
-                <a:latin typeface="Calibri"/>
-                <a:ea typeface=""/>
-                <a:cs typeface=""/>
-              </a:rPr>
-              <a:t>5V</a:t>
-            </a:r>
-            <a:endParaRPr lang="en-US" sz="2400" dirty="0" smtClean="0">
-              <a:solidFill>
-                <a:sysClr val="windowText" lastClr="000000"/>
-              </a:solidFill>
-              <a:latin typeface="Calibri"/>
-              <a:ea typeface=""/>
-              <a:cs typeface=""/>
-            </a:endParaRPr>
           </a:p>
           <a:p>
             <a:pPr>
@@ -20087,21 +20037,8 @@
             <a:pPr algn="ctr"/>
             <a:r>
               <a:rPr lang="en-US" sz="1600" dirty="0" smtClean="0"/>
-              <a:t>‘X</a:t>
+              <a:t>‘X’ is an 8-bit value (Current temperature and fan speed).</a:t>
             </a:r>
-            <a:r>
-              <a:rPr lang="en-US" sz="1600" dirty="0" smtClean="0"/>
-              <a:t>’ is </a:t>
-            </a:r>
-            <a:r>
-              <a:rPr lang="en-US" sz="1600" dirty="0" smtClean="0"/>
-              <a:t>an 8-bit value (Current temperature and fan speed)</a:t>
-            </a:r>
-            <a:r>
-              <a:rPr lang="en-US" sz="1600" dirty="0" smtClean="0"/>
-              <a:t>.</a:t>
-            </a:r>
-            <a:endParaRPr lang="en-US" sz="1600" dirty="0" smtClean="0"/>
           </a:p>
           <a:p>
             <a:pPr algn="ctr"/>
@@ -20240,15 +20177,7 @@
               <a:pPr algn="ctr"/>
               <a:r>
                 <a:rPr lang="en-US" b="1" dirty="0" smtClean="0"/>
-                <a:t>Diagram of </a:t>
-              </a:r>
-              <a:r>
-                <a:rPr lang="en-US" b="1" dirty="0" smtClean="0"/>
-                <a:t>UART </a:t>
-              </a:r>
-              <a:r>
-                <a:rPr lang="en-US" b="1" dirty="0" smtClean="0"/>
-                <a:t>library</a:t>
+                <a:t>Diagram of UART library</a:t>
               </a:r>
               <a:r>
                 <a:rPr lang="en-US" b="1" baseline="30000" dirty="0" smtClean="0"/>

</xml_diff>